<commit_message>
Add exclusion of cf,sp,spp name Add link to POWO accepted_id by IAWA name extraction
</commit_message>
<xml_diff>
--- a/Explication_Onglets.pptx
+++ b/Explication_Onglets.pptx
@@ -14,6 +14,7 @@
     <p:sldId id="263" r:id="rId8"/>
     <p:sldId id="264" r:id="rId9"/>
     <p:sldId id="265" r:id="rId10"/>
+    <p:sldId id="266" r:id="rId11"/>
   </p:sldIdLst>
   <p:sldSz cx="12192000" cy="6858000"/>
   <p:notesSz cx="6858000" cy="9144000"/>
@@ -251,7 +252,7 @@
           <a:p>
             <a:fld id="{39A3AC97-1556-4226-B42E-D18C399D4C64}" type="datetimeFigureOut">
               <a:rPr lang="fr-FR" smtClean="0"/>
-              <a:t>31/01/2023</a:t>
+              <a:t>09/03/2023</a:t>
             </a:fld>
             <a:endParaRPr lang="fr-FR"/>
           </a:p>
@@ -421,7 +422,7 @@
           <a:p>
             <a:fld id="{39A3AC97-1556-4226-B42E-D18C399D4C64}" type="datetimeFigureOut">
               <a:rPr lang="fr-FR" smtClean="0"/>
-              <a:t>31/01/2023</a:t>
+              <a:t>09/03/2023</a:t>
             </a:fld>
             <a:endParaRPr lang="fr-FR"/>
           </a:p>
@@ -601,7 +602,7 @@
           <a:p>
             <a:fld id="{39A3AC97-1556-4226-B42E-D18C399D4C64}" type="datetimeFigureOut">
               <a:rPr lang="fr-FR" smtClean="0"/>
-              <a:t>31/01/2023</a:t>
+              <a:t>09/03/2023</a:t>
             </a:fld>
             <a:endParaRPr lang="fr-FR"/>
           </a:p>
@@ -771,7 +772,7 @@
           <a:p>
             <a:fld id="{39A3AC97-1556-4226-B42E-D18C399D4C64}" type="datetimeFigureOut">
               <a:rPr lang="fr-FR" smtClean="0"/>
-              <a:t>31/01/2023</a:t>
+              <a:t>09/03/2023</a:t>
             </a:fld>
             <a:endParaRPr lang="fr-FR"/>
           </a:p>
@@ -1017,7 +1018,7 @@
           <a:p>
             <a:fld id="{39A3AC97-1556-4226-B42E-D18C399D4C64}" type="datetimeFigureOut">
               <a:rPr lang="fr-FR" smtClean="0"/>
-              <a:t>31/01/2023</a:t>
+              <a:t>09/03/2023</a:t>
             </a:fld>
             <a:endParaRPr lang="fr-FR"/>
           </a:p>
@@ -1249,7 +1250,7 @@
           <a:p>
             <a:fld id="{39A3AC97-1556-4226-B42E-D18C399D4C64}" type="datetimeFigureOut">
               <a:rPr lang="fr-FR" smtClean="0"/>
-              <a:t>31/01/2023</a:t>
+              <a:t>09/03/2023</a:t>
             </a:fld>
             <a:endParaRPr lang="fr-FR"/>
           </a:p>
@@ -1616,7 +1617,7 @@
           <a:p>
             <a:fld id="{39A3AC97-1556-4226-B42E-D18C399D4C64}" type="datetimeFigureOut">
               <a:rPr lang="fr-FR" smtClean="0"/>
-              <a:t>31/01/2023</a:t>
+              <a:t>09/03/2023</a:t>
             </a:fld>
             <a:endParaRPr lang="fr-FR"/>
           </a:p>
@@ -1734,7 +1735,7 @@
           <a:p>
             <a:fld id="{39A3AC97-1556-4226-B42E-D18C399D4C64}" type="datetimeFigureOut">
               <a:rPr lang="fr-FR" smtClean="0"/>
-              <a:t>31/01/2023</a:t>
+              <a:t>09/03/2023</a:t>
             </a:fld>
             <a:endParaRPr lang="fr-FR"/>
           </a:p>
@@ -1829,7 +1830,7 @@
           <a:p>
             <a:fld id="{39A3AC97-1556-4226-B42E-D18C399D4C64}" type="datetimeFigureOut">
               <a:rPr lang="fr-FR" smtClean="0"/>
-              <a:t>31/01/2023</a:t>
+              <a:t>09/03/2023</a:t>
             </a:fld>
             <a:endParaRPr lang="fr-FR"/>
           </a:p>
@@ -2106,7 +2107,7 @@
           <a:p>
             <a:fld id="{39A3AC97-1556-4226-B42E-D18C399D4C64}" type="datetimeFigureOut">
               <a:rPr lang="fr-FR" smtClean="0"/>
-              <a:t>31/01/2023</a:t>
+              <a:t>09/03/2023</a:t>
             </a:fld>
             <a:endParaRPr lang="fr-FR"/>
           </a:p>
@@ -2359,7 +2360,7 @@
           <a:p>
             <a:fld id="{39A3AC97-1556-4226-B42E-D18C399D4C64}" type="datetimeFigureOut">
               <a:rPr lang="fr-FR" smtClean="0"/>
-              <a:t>31/01/2023</a:t>
+              <a:t>09/03/2023</a:t>
             </a:fld>
             <a:endParaRPr lang="fr-FR"/>
           </a:p>
@@ -2572,7 +2573,7 @@
           <a:p>
             <a:fld id="{39A3AC97-1556-4226-B42E-D18C399D4C64}" type="datetimeFigureOut">
               <a:rPr lang="fr-FR" smtClean="0"/>
-              <a:t>31/01/2023</a:t>
+              <a:t>09/03/2023</a:t>
             </a:fld>
             <a:endParaRPr lang="fr-FR"/>
           </a:p>
@@ -3548,6 +3549,140 @@
     <p:extLst>
       <p:ext uri="{BB962C8B-B14F-4D97-AF65-F5344CB8AC3E}">
         <p14:creationId xmlns:p14="http://schemas.microsoft.com/office/powerpoint/2010/main" val="3482087771"/>
+      </p:ext>
+    </p:extLst>
+  </p:cSld>
+  <p:clrMapOvr>
+    <a:masterClrMapping/>
+  </p:clrMapOvr>
+</p:sld>
+</file>
+
+<file path=ppt/slides/slide10.xml><?xml version="1.0" encoding="utf-8"?>
+<p:sld xmlns:a="http://schemas.openxmlformats.org/drawingml/2006/main" xmlns:r="http://schemas.openxmlformats.org/officeDocument/2006/relationships" xmlns:p="http://schemas.openxmlformats.org/presentationml/2006/main">
+  <p:cSld>
+    <p:spTree>
+      <p:nvGrpSpPr>
+        <p:cNvPr id="1" name=""/>
+        <p:cNvGrpSpPr/>
+        <p:nvPr/>
+      </p:nvGrpSpPr>
+      <p:grpSpPr>
+        <a:xfrm>
+          <a:off x="0" y="0"/>
+          <a:ext cx="0" cy="0"/>
+          <a:chOff x="0" y="0"/>
+          <a:chExt cx="0" cy="0"/>
+        </a:xfrm>
+      </p:grpSpPr>
+      <p:sp>
+        <p:nvSpPr>
+          <p:cNvPr id="2" name="ZoneTexte 1"/>
+          <p:cNvSpPr txBox="1"/>
+          <p:nvPr/>
+        </p:nvSpPr>
+        <p:spPr>
+          <a:xfrm>
+            <a:off x="895739" y="821094"/>
+            <a:ext cx="9503272" cy="4524315"/>
+          </a:xfrm>
+          <a:prstGeom prst="rect">
+            <a:avLst/>
+          </a:prstGeom>
+          <a:noFill/>
+        </p:spPr>
+        <p:txBody>
+          <a:bodyPr wrap="square" rtlCol="0">
+            <a:spAutoFit/>
+          </a:bodyPr>
+          <a:lstStyle/>
+          <a:p>
+            <a:r>
+              <a:rPr lang="fr-FR" dirty="0" smtClean="0"/>
+              <a:t>REFERENCES FOR TAXA NAME AND DISTRIBUTION:</a:t>
+            </a:r>
+          </a:p>
+          <a:p>
+            <a:endParaRPr lang="fr-FR" dirty="0"/>
+          </a:p>
+          <a:p>
+            <a:r>
+              <a:rPr lang="en-GB" i="1" dirty="0"/>
+              <a:t>POWO (2023). "Plants of the World Online. Facilitated by the Royal Botanic Gardens, Kew. Published on the Internet; </a:t>
+            </a:r>
+            <a:r>
+              <a:rPr lang="en-GB" i="1" u="sng" dirty="0">
+                <a:hlinkClick r:id="rId2"/>
+              </a:rPr>
+              <a:t>http://www.plantsoftheworldonline.org/</a:t>
+            </a:r>
+            <a:r>
+              <a:rPr lang="en-GB" i="1" dirty="0"/>
+              <a:t> Retrieved 09 March 2023."</a:t>
+            </a:r>
+            <a:endParaRPr lang="en-GB" dirty="0"/>
+          </a:p>
+          <a:p>
+            <a:endParaRPr lang="en-GB" i="1" dirty="0" smtClean="0"/>
+          </a:p>
+          <a:p>
+            <a:r>
+              <a:rPr lang="en-GB" i="1" dirty="0" err="1" smtClean="0"/>
+              <a:t>Govaerts</a:t>
+            </a:r>
+            <a:r>
+              <a:rPr lang="en-GB" i="1" dirty="0"/>
+              <a:t>, R., </a:t>
+            </a:r>
+            <a:r>
+              <a:rPr lang="en-GB" i="1" dirty="0" err="1"/>
+              <a:t>Nic</a:t>
+            </a:r>
+            <a:r>
+              <a:rPr lang="en-GB" i="1" dirty="0"/>
+              <a:t> </a:t>
+            </a:r>
+            <a:r>
+              <a:rPr lang="en-GB" i="1" dirty="0" err="1"/>
+              <a:t>Lughadha</a:t>
+            </a:r>
+            <a:r>
+              <a:rPr lang="en-GB" i="1" dirty="0"/>
+              <a:t>, E., Black, N., Turner, R. &amp; Paton, A. (2021). The World Checklist of Vascular Plants, a continuously updated resource for exploring global plant diversity. https://doi.org/10.1038/s41597-021-00997-6 Scientific Data 8: 215.</a:t>
+            </a:r>
+            <a:endParaRPr lang="en-GB" dirty="0"/>
+          </a:p>
+          <a:p>
+            <a:endParaRPr lang="en-GB" i="1" dirty="0" smtClean="0"/>
+          </a:p>
+          <a:p>
+            <a:r>
+              <a:rPr lang="en-GB" i="1" dirty="0" err="1" smtClean="0"/>
+              <a:t>Brummitt</a:t>
+            </a:r>
+            <a:r>
+              <a:rPr lang="en-GB" i="1" dirty="0"/>
+              <a:t>, R. K. (2001). World Geographical Scheme for Recording Plant Distributions, </a:t>
+            </a:r>
+            <a:r>
+              <a:rPr lang="en-GB" i="1" dirty="0" err="1"/>
+              <a:t>ed</a:t>
+            </a:r>
+            <a:r>
+              <a:rPr lang="en-GB" i="1" dirty="0"/>
+              <a:t> 2. xvi, 138 pp. Hunt Institute for Botanical Documentation, Carnegie-Mellon University, Pittsburgh, Penna. (for the International Working Group on Taxonomic Databases for Plant Sciences). (Plant Taxonomic Database Standards, 2: version 1.0.) [ https://web.archive.org/web/20160125135239/http:/www.nhm.ac.uk/hosted_sites/tdwg/TDWG_geo2.pdf ]</a:t>
+            </a:r>
+            <a:endParaRPr lang="en-GB" dirty="0"/>
+          </a:p>
+          <a:p>
+            <a:endParaRPr lang="fr-FR" dirty="0"/>
+          </a:p>
+        </p:txBody>
+      </p:sp>
+    </p:spTree>
+    <p:extLst>
+      <p:ext uri="{BB962C8B-B14F-4D97-AF65-F5344CB8AC3E}">
+        <p14:creationId xmlns:p14="http://schemas.microsoft.com/office/powerpoint/2010/main" val="4033726409"/>
       </p:ext>
     </p:extLst>
   </p:cSld>
@@ -10292,13 +10427,8 @@
             </a:r>
             <a:r>
               <a:rPr lang="fr-FR" b="1" dirty="0" smtClean="0"/>
-              <a:t> </a:t>
-            </a:r>
-            <a:r>
-              <a:rPr lang="fr-FR" b="1" dirty="0" smtClean="0"/>
-              <a:t>nettoyé </a:t>
-            </a:r>
-            <a:endParaRPr lang="fr-FR" b="1" dirty="0" smtClean="0"/>
+              <a:t> nettoyé </a:t>
+            </a:r>
           </a:p>
           <a:p>
             <a:endParaRPr lang="fr-FR" b="1" dirty="0" smtClean="0"/>
@@ -10821,7 +10951,16 @@
                 </a:solidFill>
                 <a:sym typeface="Wingdings" panose="05000000000000000000" pitchFamily="2" charset="2"/>
               </a:rPr>
-              <a:t>(151 entrées </a:t>
+              <a:t>(151 entrées avec </a:t>
+            </a:r>
+            <a:r>
+              <a:rPr lang="fr-FR" i="1" dirty="0" smtClean="0">
+                <a:solidFill>
+                  <a:schemeClr val="accent5"/>
+                </a:solidFill>
+                <a:sym typeface="Wingdings" panose="05000000000000000000" pitchFamily="2" charset="2"/>
+              </a:rPr>
+              <a:t>liens</a:t>
             </a:r>
             <a:r>
               <a:rPr lang="fr-FR" i="1" dirty="0" smtClean="0">
@@ -10832,16 +10971,43 @@
                 </a:solidFill>
                 <a:sym typeface="Wingdings" panose="05000000000000000000" pitchFamily="2" charset="2"/>
               </a:rPr>
-              <a:t>avec </a:t>
-            </a:r>
-            <a:r>
-              <a:rPr lang="fr-FR" i="1" dirty="0" smtClean="0">
+              <a:t> de B à EV</a:t>
+            </a:r>
+            <a:r>
+              <a:rPr lang="fr-FR" i="1" dirty="0">
                 <a:solidFill>
-                  <a:schemeClr val="accent5"/>
+                  <a:schemeClr val="bg1">
+                    <a:lumMod val="50000"/>
+                  </a:schemeClr>
                 </a:solidFill>
+              </a:rPr>
+              <a:t>[</a:t>
+            </a:r>
+            <a:r>
+              <a:rPr lang="fr-FR" i="1" dirty="0" err="1">
+                <a:solidFill>
+                  <a:schemeClr val="bg1">
+                    <a:lumMod val="50000"/>
+                  </a:schemeClr>
+                </a:solidFill>
+              </a:rPr>
+              <a:t>IAWA_Afrique</a:t>
+            </a:r>
+            <a:r>
+              <a:rPr lang="fr-FR" i="1" dirty="0">
+                <a:solidFill>
+                  <a:schemeClr val="bg1">
+                    <a:lumMod val="50000"/>
+                  </a:schemeClr>
+                </a:solidFill>
+              </a:rPr>
+              <a:t>]</a:t>
+            </a:r>
+            <a:r>
+              <a:rPr lang="fr-FR" dirty="0">
                 <a:sym typeface="Wingdings" panose="05000000000000000000" pitchFamily="2" charset="2"/>
               </a:rPr>
-              <a:t>liens</a:t>
+              <a:t> </a:t>
             </a:r>
             <a:r>
               <a:rPr lang="fr-FR" i="1" dirty="0" smtClean="0">
@@ -10852,74 +11018,8 @@
                 </a:solidFill>
                 <a:sym typeface="Wingdings" panose="05000000000000000000" pitchFamily="2" charset="2"/>
               </a:rPr>
-              <a:t> </a:t>
-            </a:r>
-            <a:r>
-              <a:rPr lang="fr-FR" i="1" dirty="0" smtClean="0">
-                <a:solidFill>
-                  <a:schemeClr val="bg1">
-                    <a:lumMod val="50000"/>
-                  </a:schemeClr>
-                </a:solidFill>
-                <a:sym typeface="Wingdings" panose="05000000000000000000" pitchFamily="2" charset="2"/>
-              </a:rPr>
-              <a:t>de B à EV</a:t>
-            </a:r>
-            <a:r>
-              <a:rPr lang="fr-FR" i="1" dirty="0">
-                <a:solidFill>
-                  <a:schemeClr val="bg1">
-                    <a:lumMod val="50000"/>
-                  </a:schemeClr>
-                </a:solidFill>
-              </a:rPr>
-              <a:t>[</a:t>
-            </a:r>
-            <a:r>
-              <a:rPr lang="fr-FR" i="1" dirty="0" err="1">
-                <a:solidFill>
-                  <a:schemeClr val="bg1">
-                    <a:lumMod val="50000"/>
-                  </a:schemeClr>
-                </a:solidFill>
-              </a:rPr>
-              <a:t>IAWA_Afrique</a:t>
-            </a:r>
-            <a:r>
-              <a:rPr lang="fr-FR" i="1" dirty="0">
-                <a:solidFill>
-                  <a:schemeClr val="bg1">
-                    <a:lumMod val="50000"/>
-                  </a:schemeClr>
-                </a:solidFill>
-              </a:rPr>
-              <a:t>]</a:t>
-            </a:r>
-            <a:r>
-              <a:rPr lang="fr-FR" dirty="0">
-                <a:sym typeface="Wingdings" panose="05000000000000000000" pitchFamily="2" charset="2"/>
-              </a:rPr>
-              <a:t> </a:t>
-            </a:r>
-            <a:r>
-              <a:rPr lang="fr-FR" i="1" dirty="0" smtClean="0">
-                <a:solidFill>
-                  <a:schemeClr val="bg1">
-                    <a:lumMod val="50000"/>
-                  </a:schemeClr>
-                </a:solidFill>
-                <a:sym typeface="Wingdings" panose="05000000000000000000" pitchFamily="2" charset="2"/>
-              </a:rPr>
               <a:t>)</a:t>
             </a:r>
-            <a:endParaRPr lang="fr-FR" i="1" dirty="0" smtClean="0">
-              <a:solidFill>
-                <a:schemeClr val="bg1">
-                  <a:lumMod val="50000"/>
-                </a:schemeClr>
-              </a:solidFill>
-              <a:sym typeface="Wingdings" panose="05000000000000000000" pitchFamily="2" charset="2"/>
-            </a:endParaRPr>
           </a:p>
           <a:p>
             <a:pPr lvl="2">

</xml_diff>